<commit_message>
slight modifications based on specs
</commit_message>
<xml_diff>
--- a/HW4.pptx
+++ b/HW4.pptx
@@ -5,16 +5,17 @@
     <p:sldMasterId id="2147483673" r:id="rId1"/>
   </p:sldMasterIdLst>
   <p:notesMasterIdLst>
-    <p:notesMasterId r:id="rId9"/>
+    <p:notesMasterId r:id="rId10"/>
   </p:notesMasterIdLst>
   <p:sldIdLst>
     <p:sldId id="256" r:id="rId2"/>
     <p:sldId id="271" r:id="rId3"/>
-    <p:sldId id="272" r:id="rId4"/>
-    <p:sldId id="270" r:id="rId5"/>
-    <p:sldId id="273" r:id="rId6"/>
-    <p:sldId id="274" r:id="rId7"/>
-    <p:sldId id="269" r:id="rId8"/>
+    <p:sldId id="275" r:id="rId4"/>
+    <p:sldId id="272" r:id="rId5"/>
+    <p:sldId id="270" r:id="rId6"/>
+    <p:sldId id="273" r:id="rId7"/>
+    <p:sldId id="274" r:id="rId8"/>
+    <p:sldId id="269" r:id="rId9"/>
   </p:sldIdLst>
   <p:sldSz cx="12192000" cy="6858000"/>
   <p:notesSz cx="6858000" cy="9144000"/>
@@ -1577,7 +1578,7 @@
           <a:p>
             <a:fld id="{2747D2AE-6F0F-1942-B8BE-938C97736A66}" type="datetimeFigureOut">
               <a:rPr lang="en-US" smtClean="0"/>
-              <a:t>5/29/23</a:t>
+              <a:t>6/1/23</a:t>
             </a:fld>
             <a:endParaRPr lang="en-US"/>
           </a:p>
@@ -1993,7 +1994,7 @@
           <a:p>
             <a:fld id="{781F77C5-E7B6-7B4F-A177-629EA050D2EF}" type="slidenum">
               <a:rPr lang="en-US" smtClean="0"/>
-              <a:t>5</a:t>
+              <a:t>6</a:t>
             </a:fld>
             <a:endParaRPr lang="en-US"/>
           </a:p>
@@ -2077,7 +2078,7 @@
           <a:p>
             <a:fld id="{781F77C5-E7B6-7B4F-A177-629EA050D2EF}" type="slidenum">
               <a:rPr lang="en-US" smtClean="0"/>
-              <a:t>6</a:t>
+              <a:t>7</a:t>
             </a:fld>
             <a:endParaRPr lang="en-US"/>
           </a:p>
@@ -2252,7 +2253,7 @@
           <a:p>
             <a:fld id="{02AC24A9-CCB6-4F8D-B8DB-C2F3692CFA5A}" type="datetimeFigureOut">
               <a:rPr lang="en-US" smtClean="0"/>
-              <a:t>5/29/23</a:t>
+              <a:t>6/1/23</a:t>
             </a:fld>
             <a:endParaRPr lang="en-US" dirty="0"/>
           </a:p>
@@ -2622,7 +2623,7 @@
           <a:p>
             <a:fld id="{02AC24A9-CCB6-4F8D-B8DB-C2F3692CFA5A}" type="datetimeFigureOut">
               <a:rPr lang="en-US" smtClean="0"/>
-              <a:t>5/29/23</a:t>
+              <a:t>6/1/23</a:t>
             </a:fld>
             <a:endParaRPr lang="en-US"/>
           </a:p>
@@ -2831,7 +2832,7 @@
           <a:p>
             <a:fld id="{02AC24A9-CCB6-4F8D-B8DB-C2F3692CFA5A}" type="datetimeFigureOut">
               <a:rPr lang="en-US" smtClean="0"/>
-              <a:t>5/29/23</a:t>
+              <a:t>6/1/23</a:t>
             </a:fld>
             <a:endParaRPr lang="en-US"/>
           </a:p>
@@ -3301,7 +3302,7 @@
           <a:p>
             <a:fld id="{02AC24A9-CCB6-4F8D-B8DB-C2F3692CFA5A}" type="datetimeFigureOut">
               <a:rPr lang="en-US" smtClean="0"/>
-              <a:t>5/29/23</a:t>
+              <a:t>6/1/23</a:t>
             </a:fld>
             <a:endParaRPr lang="en-US"/>
           </a:p>
@@ -3755,7 +3756,7 @@
           <a:p>
             <a:fld id="{02AC24A9-CCB6-4F8D-B8DB-C2F3692CFA5A}" type="datetimeFigureOut">
               <a:rPr lang="en-US" smtClean="0"/>
-              <a:t>5/29/23</a:t>
+              <a:t>6/1/23</a:t>
             </a:fld>
             <a:endParaRPr lang="en-US"/>
           </a:p>
@@ -4287,7 +4288,7 @@
           <a:p>
             <a:fld id="{02AC24A9-CCB6-4F8D-B8DB-C2F3692CFA5A}" type="datetimeFigureOut">
               <a:rPr lang="en-US" smtClean="0"/>
-              <a:t>5/29/23</a:t>
+              <a:t>6/1/23</a:t>
             </a:fld>
             <a:endParaRPr lang="en-US"/>
           </a:p>
@@ -4986,7 +4987,7 @@
           <a:p>
             <a:fld id="{02AC24A9-CCB6-4F8D-B8DB-C2F3692CFA5A}" type="datetimeFigureOut">
               <a:rPr lang="en-US" smtClean="0"/>
-              <a:t>5/29/23</a:t>
+              <a:t>6/1/23</a:t>
             </a:fld>
             <a:endParaRPr lang="en-US"/>
           </a:p>
@@ -5315,7 +5316,7 @@
           <a:p>
             <a:fld id="{02AC24A9-CCB6-4F8D-B8DB-C2F3692CFA5A}" type="datetimeFigureOut">
               <a:rPr lang="en-US" smtClean="0"/>
-              <a:t>5/29/23</a:t>
+              <a:t>6/1/23</a:t>
             </a:fld>
             <a:endParaRPr lang="en-US"/>
           </a:p>
@@ -5428,7 +5429,7 @@
           <a:p>
             <a:fld id="{02AC24A9-CCB6-4F8D-B8DB-C2F3692CFA5A}" type="datetimeFigureOut">
               <a:rPr lang="en-US" smtClean="0"/>
-              <a:t>5/29/23</a:t>
+              <a:t>6/1/23</a:t>
             </a:fld>
             <a:endParaRPr lang="en-US"/>
           </a:p>
@@ -5923,7 +5924,7 @@
           <a:p>
             <a:fld id="{02AC24A9-CCB6-4F8D-B8DB-C2F3692CFA5A}" type="datetimeFigureOut">
               <a:rPr lang="en-US" smtClean="0"/>
-              <a:t>5/29/23</a:t>
+              <a:t>6/1/23</a:t>
             </a:fld>
             <a:endParaRPr lang="en-US" dirty="0"/>
           </a:p>
@@ -6400,7 +6401,7 @@
           <a:p>
             <a:fld id="{02AC24A9-CCB6-4F8D-B8DB-C2F3692CFA5A}" type="datetimeFigureOut">
               <a:rPr lang="en-US" smtClean="0"/>
-              <a:t>5/29/23</a:t>
+              <a:t>6/1/23</a:t>
             </a:fld>
             <a:endParaRPr lang="en-US"/>
           </a:p>
@@ -6643,7 +6644,7 @@
           <a:p>
             <a:fld id="{02AC24A9-CCB6-4F8D-B8DB-C2F3692CFA5A}" type="datetimeFigureOut">
               <a:rPr lang="en-US" smtClean="0"/>
-              <a:t>5/29/23</a:t>
+              <a:t>6/1/23</a:t>
             </a:fld>
             <a:endParaRPr lang="en-US"/>
           </a:p>
@@ -7594,6 +7595,620 @@
           <a:p>
             <a:r>
               <a:rPr lang="en-US" dirty="0"/>
+              <a:t>Term Concepts</a:t>
+            </a:r>
+          </a:p>
+        </p:txBody>
+      </p:sp>
+      <p:sp>
+        <p:nvSpPr>
+          <p:cNvPr id="6" name="Rounded Rectangle 5">
+            <a:extLst>
+              <a:ext uri="{FF2B5EF4-FFF2-40B4-BE49-F238E27FC236}">
+                <a16:creationId xmlns:a16="http://schemas.microsoft.com/office/drawing/2014/main" id="{E7EA76EA-1F1E-C8E7-74A7-294AC101F2AC}"/>
+              </a:ext>
+            </a:extLst>
+          </p:cNvPr>
+          <p:cNvSpPr/>
+          <p:nvPr/>
+        </p:nvSpPr>
+        <p:spPr>
+          <a:xfrm>
+            <a:off x="929259" y="2683765"/>
+            <a:ext cx="3166110" cy="2446020"/>
+          </a:xfrm>
+          <a:prstGeom prst="roundRect">
+            <a:avLst/>
+          </a:prstGeom>
+          <a:solidFill>
+            <a:schemeClr val="accent6"/>
+          </a:solidFill>
+        </p:spPr>
+        <p:style>
+          <a:lnRef idx="2">
+            <a:schemeClr val="accent1">
+              <a:shade val="50000"/>
+            </a:schemeClr>
+          </a:lnRef>
+          <a:fillRef idx="1">
+            <a:schemeClr val="accent1"/>
+          </a:fillRef>
+          <a:effectRef idx="0">
+            <a:schemeClr val="accent1"/>
+          </a:effectRef>
+          <a:fontRef idx="minor">
+            <a:schemeClr val="lt1"/>
+          </a:fontRef>
+        </p:style>
+        <p:txBody>
+          <a:bodyPr rtlCol="0" anchor="ctr"/>
+          <a:lstStyle/>
+          <a:p>
+            <a:pPr algn="ctr"/>
+            <a:endParaRPr lang="en-US" dirty="0"/>
+          </a:p>
+        </p:txBody>
+      </p:sp>
+      <p:sp>
+        <p:nvSpPr>
+          <p:cNvPr id="7" name="Rounded Rectangle 6">
+            <a:extLst>
+              <a:ext uri="{FF2B5EF4-FFF2-40B4-BE49-F238E27FC236}">
+                <a16:creationId xmlns:a16="http://schemas.microsoft.com/office/drawing/2014/main" id="{B42AEA7C-B9ED-B6D8-4C34-D76854D3B3E3}"/>
+              </a:ext>
+            </a:extLst>
+          </p:cNvPr>
+          <p:cNvSpPr/>
+          <p:nvPr/>
+        </p:nvSpPr>
+        <p:spPr>
+          <a:xfrm>
+            <a:off x="4616575" y="2683765"/>
+            <a:ext cx="3166110" cy="2446020"/>
+          </a:xfrm>
+          <a:prstGeom prst="roundRect">
+            <a:avLst/>
+          </a:prstGeom>
+          <a:solidFill>
+            <a:schemeClr val="accent6"/>
+          </a:solidFill>
+        </p:spPr>
+        <p:style>
+          <a:lnRef idx="2">
+            <a:schemeClr val="accent1">
+              <a:shade val="50000"/>
+            </a:schemeClr>
+          </a:lnRef>
+          <a:fillRef idx="1">
+            <a:schemeClr val="accent1"/>
+          </a:fillRef>
+          <a:effectRef idx="0">
+            <a:schemeClr val="accent1"/>
+          </a:effectRef>
+          <a:fontRef idx="minor">
+            <a:schemeClr val="lt1"/>
+          </a:fontRef>
+        </p:style>
+        <p:txBody>
+          <a:bodyPr rtlCol="0" anchor="ctr"/>
+          <a:lstStyle/>
+          <a:p>
+            <a:pPr algn="ctr"/>
+            <a:endParaRPr lang="en-US"/>
+          </a:p>
+        </p:txBody>
+      </p:sp>
+      <p:sp>
+        <p:nvSpPr>
+          <p:cNvPr id="8" name="Rounded Rectangle 7">
+            <a:extLst>
+              <a:ext uri="{FF2B5EF4-FFF2-40B4-BE49-F238E27FC236}">
+                <a16:creationId xmlns:a16="http://schemas.microsoft.com/office/drawing/2014/main" id="{530DB3E7-C11E-59CC-5108-710B165E2386}"/>
+              </a:ext>
+            </a:extLst>
+          </p:cNvPr>
+          <p:cNvSpPr/>
+          <p:nvPr/>
+        </p:nvSpPr>
+        <p:spPr>
+          <a:xfrm>
+            <a:off x="8282940" y="2657689"/>
+            <a:ext cx="3166110" cy="2446020"/>
+          </a:xfrm>
+          <a:prstGeom prst="roundRect">
+            <a:avLst/>
+          </a:prstGeom>
+          <a:solidFill>
+            <a:schemeClr val="accent6"/>
+          </a:solidFill>
+        </p:spPr>
+        <p:style>
+          <a:lnRef idx="2">
+            <a:schemeClr val="accent1">
+              <a:shade val="50000"/>
+            </a:schemeClr>
+          </a:lnRef>
+          <a:fillRef idx="1">
+            <a:schemeClr val="accent1"/>
+          </a:fillRef>
+          <a:effectRef idx="0">
+            <a:schemeClr val="accent1"/>
+          </a:effectRef>
+          <a:fontRef idx="minor">
+            <a:schemeClr val="lt1"/>
+          </a:fontRef>
+        </p:style>
+        <p:txBody>
+          <a:bodyPr rtlCol="0" anchor="ctr"/>
+          <a:lstStyle/>
+          <a:p>
+            <a:pPr algn="ctr"/>
+            <a:endParaRPr lang="en-US"/>
+          </a:p>
+        </p:txBody>
+      </p:sp>
+      <p:sp>
+        <p:nvSpPr>
+          <p:cNvPr id="9" name="TextBox 8">
+            <a:extLst>
+              <a:ext uri="{FF2B5EF4-FFF2-40B4-BE49-F238E27FC236}">
+                <a16:creationId xmlns:a16="http://schemas.microsoft.com/office/drawing/2014/main" id="{87BD0FC7-7580-EF14-7C5B-384F803F3177}"/>
+              </a:ext>
+            </a:extLst>
+          </p:cNvPr>
+          <p:cNvSpPr txBox="1"/>
+          <p:nvPr/>
+        </p:nvSpPr>
+        <p:spPr>
+          <a:xfrm>
+            <a:off x="1530795" y="2800350"/>
+            <a:ext cx="2065630" cy="369332"/>
+          </a:xfrm>
+          <a:prstGeom prst="rect">
+            <a:avLst/>
+          </a:prstGeom>
+          <a:noFill/>
+        </p:spPr>
+        <p:txBody>
+          <a:bodyPr wrap="none" rtlCol="0">
+            <a:spAutoFit/>
+          </a:bodyPr>
+          <a:lstStyle/>
+          <a:p>
+            <a:r>
+              <a:rPr lang="en-US" b="1" dirty="0"/>
+              <a:t>Unfactored MNA</a:t>
+            </a:r>
+          </a:p>
+        </p:txBody>
+      </p:sp>
+      <p:sp>
+        <p:nvSpPr>
+          <p:cNvPr id="10" name="TextBox 9">
+            <a:extLst>
+              <a:ext uri="{FF2B5EF4-FFF2-40B4-BE49-F238E27FC236}">
+                <a16:creationId xmlns:a16="http://schemas.microsoft.com/office/drawing/2014/main" id="{35F6C3C9-96EE-19AB-0AA9-1138AC92F025}"/>
+              </a:ext>
+            </a:extLst>
+          </p:cNvPr>
+          <p:cNvSpPr txBox="1"/>
+          <p:nvPr/>
+        </p:nvSpPr>
+        <p:spPr>
+          <a:xfrm>
+            <a:off x="5341448" y="2800350"/>
+            <a:ext cx="1791709" cy="369332"/>
+          </a:xfrm>
+          <a:prstGeom prst="rect">
+            <a:avLst/>
+          </a:prstGeom>
+          <a:noFill/>
+        </p:spPr>
+        <p:txBody>
+          <a:bodyPr wrap="none" rtlCol="0">
+            <a:spAutoFit/>
+          </a:bodyPr>
+          <a:lstStyle/>
+          <a:p>
+            <a:r>
+              <a:rPr lang="en-US" b="1" dirty="0"/>
+              <a:t>Factored MNA</a:t>
+            </a:r>
+          </a:p>
+        </p:txBody>
+      </p:sp>
+      <p:sp>
+        <p:nvSpPr>
+          <p:cNvPr id="11" name="TextBox 10">
+            <a:extLst>
+              <a:ext uri="{FF2B5EF4-FFF2-40B4-BE49-F238E27FC236}">
+                <a16:creationId xmlns:a16="http://schemas.microsoft.com/office/drawing/2014/main" id="{96021400-FC99-6BA7-CA0D-48D694D81CEB}"/>
+              </a:ext>
+            </a:extLst>
+          </p:cNvPr>
+          <p:cNvSpPr txBox="1"/>
+          <p:nvPr/>
+        </p:nvSpPr>
+        <p:spPr>
+          <a:xfrm>
+            <a:off x="8343110" y="2800350"/>
+            <a:ext cx="3045770" cy="369332"/>
+          </a:xfrm>
+          <a:prstGeom prst="rect">
+            <a:avLst/>
+          </a:prstGeom>
+          <a:noFill/>
+        </p:spPr>
+        <p:txBody>
+          <a:bodyPr wrap="none" rtlCol="0">
+            <a:spAutoFit/>
+          </a:bodyPr>
+          <a:lstStyle/>
+          <a:p>
+            <a:r>
+              <a:rPr lang="en-US" b="1" dirty="0"/>
+              <a:t>Latency Insertion Method</a:t>
+            </a:r>
+          </a:p>
+        </p:txBody>
+      </p:sp>
+      <p:sp>
+        <p:nvSpPr>
+          <p:cNvPr id="12" name="TextBox 11">
+            <a:extLst>
+              <a:ext uri="{FF2B5EF4-FFF2-40B4-BE49-F238E27FC236}">
+                <a16:creationId xmlns:a16="http://schemas.microsoft.com/office/drawing/2014/main" id="{F460F0E1-FE38-1E03-0FD8-15C2CC3CDCDB}"/>
+              </a:ext>
+            </a:extLst>
+          </p:cNvPr>
+          <p:cNvSpPr txBox="1"/>
+          <p:nvPr/>
+        </p:nvSpPr>
+        <p:spPr>
+          <a:xfrm>
+            <a:off x="1115568" y="3411069"/>
+            <a:ext cx="2612062" cy="1477328"/>
+          </a:xfrm>
+          <a:prstGeom prst="rect">
+            <a:avLst/>
+          </a:prstGeom>
+          <a:noFill/>
+        </p:spPr>
+        <p:txBody>
+          <a:bodyPr wrap="none" rtlCol="0">
+            <a:spAutoFit/>
+          </a:bodyPr>
+          <a:lstStyle/>
+          <a:p>
+            <a:pPr marL="285750" indent="-285750">
+              <a:buFontTx/>
+              <a:buChar char="-"/>
+            </a:pPr>
+            <a:r>
+              <a:rPr lang="en-US" dirty="0"/>
+              <a:t>Parsing element list</a:t>
+            </a:r>
+          </a:p>
+          <a:p>
+            <a:pPr marL="285750" indent="-285750">
+              <a:buFontTx/>
+              <a:buChar char="-"/>
+            </a:pPr>
+            <a:r>
+              <a:rPr lang="en-US" dirty="0"/>
+              <a:t>Elemental stamping</a:t>
+            </a:r>
+          </a:p>
+          <a:p>
+            <a:pPr marL="285750" indent="-285750">
+              <a:buFontTx/>
+              <a:buChar char="-"/>
+            </a:pPr>
+            <a:r>
+              <a:rPr lang="en-US" dirty="0"/>
+              <a:t>For loop iteration:</a:t>
+            </a:r>
+          </a:p>
+          <a:p>
+            <a:pPr marL="742950" lvl="1" indent="-285750">
+              <a:buFontTx/>
+              <a:buChar char="-"/>
+            </a:pPr>
+            <a:r>
+              <a:rPr lang="en-US" dirty="0"/>
+              <a:t>LU Factorization</a:t>
+            </a:r>
+          </a:p>
+          <a:p>
+            <a:pPr marL="742950" lvl="1" indent="-285750">
+              <a:buFontTx/>
+              <a:buChar char="-"/>
+            </a:pPr>
+            <a:r>
+              <a:rPr lang="en-US" dirty="0"/>
+              <a:t>LU Solve</a:t>
+            </a:r>
+          </a:p>
+        </p:txBody>
+      </p:sp>
+      <p:sp>
+        <p:nvSpPr>
+          <p:cNvPr id="13" name="TextBox 12">
+            <a:extLst>
+              <a:ext uri="{FF2B5EF4-FFF2-40B4-BE49-F238E27FC236}">
+                <a16:creationId xmlns:a16="http://schemas.microsoft.com/office/drawing/2014/main" id="{21B5F072-2A74-F1B4-FC78-FA3773407CC3}"/>
+              </a:ext>
+            </a:extLst>
+          </p:cNvPr>
+          <p:cNvSpPr txBox="1"/>
+          <p:nvPr/>
+        </p:nvSpPr>
+        <p:spPr>
+          <a:xfrm>
+            <a:off x="4915465" y="3429000"/>
+            <a:ext cx="2568332" cy="1477328"/>
+          </a:xfrm>
+          <a:prstGeom prst="rect">
+            <a:avLst/>
+          </a:prstGeom>
+          <a:noFill/>
+        </p:spPr>
+        <p:txBody>
+          <a:bodyPr wrap="none" rtlCol="0">
+            <a:spAutoFit/>
+          </a:bodyPr>
+          <a:lstStyle/>
+          <a:p>
+            <a:pPr marL="285750" indent="-285750">
+              <a:buFontTx/>
+              <a:buChar char="-"/>
+            </a:pPr>
+            <a:r>
+              <a:rPr lang="en-US" dirty="0"/>
+              <a:t>Parsing element list</a:t>
+            </a:r>
+          </a:p>
+          <a:p>
+            <a:pPr marL="285750" indent="-285750">
+              <a:buFontTx/>
+              <a:buChar char="-"/>
+            </a:pPr>
+            <a:r>
+              <a:rPr lang="en-US" dirty="0"/>
+              <a:t>Elemental stamping</a:t>
+            </a:r>
+          </a:p>
+          <a:p>
+            <a:pPr marL="285750" indent="-285750">
+              <a:buFontTx/>
+              <a:buChar char="-"/>
+            </a:pPr>
+            <a:r>
+              <a:rPr lang="en-US" dirty="0"/>
+              <a:t>LU Factorization</a:t>
+            </a:r>
+          </a:p>
+          <a:p>
+            <a:pPr marL="285750" indent="-285750">
+              <a:buFontTx/>
+              <a:buChar char="-"/>
+            </a:pPr>
+            <a:r>
+              <a:rPr lang="en-US" dirty="0"/>
+              <a:t>For loop iteration:</a:t>
+            </a:r>
+          </a:p>
+          <a:p>
+            <a:pPr marL="742950" lvl="1" indent="-285750">
+              <a:buFontTx/>
+              <a:buChar char="-"/>
+            </a:pPr>
+            <a:r>
+              <a:rPr lang="en-US" dirty="0"/>
+              <a:t>LU Solve</a:t>
+            </a:r>
+          </a:p>
+        </p:txBody>
+      </p:sp>
+      <p:sp>
+        <p:nvSpPr>
+          <p:cNvPr id="14" name="TextBox 13">
+            <a:extLst>
+              <a:ext uri="{FF2B5EF4-FFF2-40B4-BE49-F238E27FC236}">
+                <a16:creationId xmlns:a16="http://schemas.microsoft.com/office/drawing/2014/main" id="{5822BCB0-ADB0-74E8-280B-DDFEB5048FBC}"/>
+              </a:ext>
+            </a:extLst>
+          </p:cNvPr>
+          <p:cNvSpPr txBox="1"/>
+          <p:nvPr/>
+        </p:nvSpPr>
+        <p:spPr>
+          <a:xfrm>
+            <a:off x="8611676" y="3223261"/>
+            <a:ext cx="2657822" cy="1754326"/>
+          </a:xfrm>
+          <a:prstGeom prst="rect">
+            <a:avLst/>
+          </a:prstGeom>
+          <a:noFill/>
+        </p:spPr>
+        <p:txBody>
+          <a:bodyPr wrap="square" rtlCol="0">
+            <a:spAutoFit/>
+          </a:bodyPr>
+          <a:lstStyle/>
+          <a:p>
+            <a:pPr marL="285750" indent="-285750">
+              <a:buFontTx/>
+              <a:buChar char="-"/>
+            </a:pPr>
+            <a:r>
+              <a:rPr lang="en-US" dirty="0"/>
+              <a:t>Parsing element list</a:t>
+            </a:r>
+          </a:p>
+          <a:p>
+            <a:pPr marL="285750" indent="-285750">
+              <a:buFontTx/>
+              <a:buChar char="-"/>
+            </a:pPr>
+            <a:r>
+              <a:rPr lang="en-US" dirty="0"/>
+              <a:t>For loop iteration:</a:t>
+            </a:r>
+          </a:p>
+          <a:p>
+            <a:pPr marL="742950" lvl="1" indent="-285750">
+              <a:buFontTx/>
+              <a:buChar char="-"/>
+            </a:pPr>
+            <a:r>
+              <a:rPr lang="en-US" dirty="0"/>
+              <a:t>Solving node voltages</a:t>
+            </a:r>
+          </a:p>
+          <a:p>
+            <a:pPr marL="742950" lvl="1" indent="-285750">
+              <a:buFontTx/>
+              <a:buChar char="-"/>
+            </a:pPr>
+            <a:r>
+              <a:rPr lang="en-US" dirty="0"/>
+              <a:t>Solving node currents</a:t>
+            </a:r>
+          </a:p>
+        </p:txBody>
+      </p:sp>
+      <p:cxnSp>
+        <p:nvCxnSpPr>
+          <p:cNvPr id="16" name="Straight Arrow Connector 15">
+            <a:extLst>
+              <a:ext uri="{FF2B5EF4-FFF2-40B4-BE49-F238E27FC236}">
+                <a16:creationId xmlns:a16="http://schemas.microsoft.com/office/drawing/2014/main" id="{C022CB98-7514-733A-1FF7-933B0F3649DB}"/>
+              </a:ext>
+            </a:extLst>
+          </p:cNvPr>
+          <p:cNvCxnSpPr/>
+          <p:nvPr/>
+        </p:nvCxnSpPr>
+        <p:spPr>
+          <a:xfrm>
+            <a:off x="1530795" y="5772150"/>
+            <a:ext cx="9053385" cy="0"/>
+          </a:xfrm>
+          <a:prstGeom prst="straightConnector1">
+            <a:avLst/>
+          </a:prstGeom>
+          <a:ln w="76200">
+            <a:solidFill>
+              <a:srgbClr val="00B050"/>
+            </a:solidFill>
+            <a:tailEnd type="triangle"/>
+          </a:ln>
+        </p:spPr>
+        <p:style>
+          <a:lnRef idx="1">
+            <a:schemeClr val="accent1"/>
+          </a:lnRef>
+          <a:fillRef idx="0">
+            <a:schemeClr val="accent1"/>
+          </a:fillRef>
+          <a:effectRef idx="0">
+            <a:schemeClr val="accent1"/>
+          </a:effectRef>
+          <a:fontRef idx="minor">
+            <a:schemeClr val="tx1"/>
+          </a:fontRef>
+        </p:style>
+      </p:cxnSp>
+      <p:sp>
+        <p:nvSpPr>
+          <p:cNvPr id="17" name="TextBox 16">
+            <a:extLst>
+              <a:ext uri="{FF2B5EF4-FFF2-40B4-BE49-F238E27FC236}">
+                <a16:creationId xmlns:a16="http://schemas.microsoft.com/office/drawing/2014/main" id="{D10F2CBA-26A9-D089-5ADC-9AA9E1D3B306}"/>
+              </a:ext>
+            </a:extLst>
+          </p:cNvPr>
+          <p:cNvSpPr txBox="1"/>
+          <p:nvPr/>
+        </p:nvSpPr>
+        <p:spPr>
+          <a:xfrm>
+            <a:off x="5043737" y="5875020"/>
+            <a:ext cx="2311787" cy="369332"/>
+          </a:xfrm>
+          <a:prstGeom prst="rect">
+            <a:avLst/>
+          </a:prstGeom>
+          <a:noFill/>
+        </p:spPr>
+        <p:txBody>
+          <a:bodyPr wrap="none" rtlCol="0">
+            <a:spAutoFit/>
+          </a:bodyPr>
+          <a:lstStyle/>
+          <a:p>
+            <a:r>
+              <a:rPr lang="en-US" dirty="0"/>
+              <a:t>Increasing efficiency</a:t>
+            </a:r>
+          </a:p>
+        </p:txBody>
+      </p:sp>
+    </p:spTree>
+    <p:extLst>
+      <p:ext uri="{BB962C8B-B14F-4D97-AF65-F5344CB8AC3E}">
+        <p14:creationId xmlns:p14="http://schemas.microsoft.com/office/powerpoint/2010/main" val="927106061"/>
+      </p:ext>
+    </p:extLst>
+  </p:cSld>
+  <p:clrMapOvr>
+    <a:masterClrMapping/>
+  </p:clrMapOvr>
+</p:sld>
+</file>
+
+<file path=ppt/slides/slide3.xml><?xml version="1.0" encoding="utf-8"?>
+<p:sld xmlns:a="http://schemas.openxmlformats.org/drawingml/2006/main" xmlns:r="http://schemas.openxmlformats.org/officeDocument/2006/relationships" xmlns:p="http://schemas.openxmlformats.org/presentationml/2006/main">
+  <p:cSld>
+    <p:spTree>
+      <p:nvGrpSpPr>
+        <p:cNvPr id="1" name=""/>
+        <p:cNvGrpSpPr/>
+        <p:nvPr/>
+      </p:nvGrpSpPr>
+      <p:grpSpPr>
+        <a:xfrm>
+          <a:off x="0" y="0"/>
+          <a:ext cx="0" cy="0"/>
+          <a:chOff x="0" y="0"/>
+          <a:chExt cx="0" cy="0"/>
+        </a:xfrm>
+      </p:grpSpPr>
+      <p:sp>
+        <p:nvSpPr>
+          <p:cNvPr id="2" name="Title 1">
+            <a:extLst>
+              <a:ext uri="{FF2B5EF4-FFF2-40B4-BE49-F238E27FC236}">
+                <a16:creationId xmlns:a16="http://schemas.microsoft.com/office/drawing/2014/main" id="{17427281-9830-2FB5-E037-4213FEBE2BEF}"/>
+              </a:ext>
+            </a:extLst>
+          </p:cNvPr>
+          <p:cNvSpPr>
+            <a:spLocks noGrp="1"/>
+          </p:cNvSpPr>
+          <p:nvPr>
+            <p:ph type="title"/>
+          </p:nvPr>
+        </p:nvSpPr>
+        <p:spPr/>
+        <p:txBody>
+          <a:bodyPr/>
+          <a:lstStyle/>
+          <a:p>
+            <a:r>
+              <a:rPr lang="en-US" dirty="0"/>
               <a:t>LIM - Concept</a:t>
             </a:r>
           </a:p>
@@ -9018,7 +9633,7 @@
     </p:spTree>
     <p:extLst>
       <p:ext uri="{BB962C8B-B14F-4D97-AF65-F5344CB8AC3E}">
-        <p14:creationId xmlns:p14="http://schemas.microsoft.com/office/powerpoint/2010/main" val="927106061"/>
+        <p14:creationId xmlns:p14="http://schemas.microsoft.com/office/powerpoint/2010/main" val="1372914661"/>
       </p:ext>
     </p:extLst>
   </p:cSld>
@@ -9028,7 +9643,7 @@
 </p:sld>
 </file>
 
-<file path=ppt/slides/slide3.xml><?xml version="1.0" encoding="utf-8"?>
+<file path=ppt/slides/slide4.xml><?xml version="1.0" encoding="utf-8"?>
 <p:sld xmlns:a="http://schemas.openxmlformats.org/drawingml/2006/main" xmlns:r="http://schemas.openxmlformats.org/officeDocument/2006/relationships" xmlns:p="http://schemas.openxmlformats.org/presentationml/2006/main">
   <p:cSld>
     <p:spTree>
@@ -9295,7 +9910,7 @@
 </p:sld>
 </file>
 
-<file path=ppt/slides/slide4.xml><?xml version="1.0" encoding="utf-8"?>
+<file path=ppt/slides/slide5.xml><?xml version="1.0" encoding="utf-8"?>
 <p:sld xmlns:a="http://schemas.openxmlformats.org/drawingml/2006/main" xmlns:r="http://schemas.openxmlformats.org/officeDocument/2006/relationships" xmlns:p="http://schemas.openxmlformats.org/presentationml/2006/main">
   <p:cSld>
     <p:spTree>
@@ -9565,304 +10180,6 @@
 </p:sld>
 </file>
 
-<file path=ppt/slides/slide5.xml><?xml version="1.0" encoding="utf-8"?>
-<p:sld xmlns:a="http://schemas.openxmlformats.org/drawingml/2006/main" xmlns:r="http://schemas.openxmlformats.org/officeDocument/2006/relationships" xmlns:p="http://schemas.openxmlformats.org/presentationml/2006/main">
-  <p:cSld>
-    <p:spTree>
-      <p:nvGrpSpPr>
-        <p:cNvPr id="1" name=""/>
-        <p:cNvGrpSpPr/>
-        <p:nvPr/>
-      </p:nvGrpSpPr>
-      <p:grpSpPr>
-        <a:xfrm>
-          <a:off x="0" y="0"/>
-          <a:ext cx="0" cy="0"/>
-          <a:chOff x="0" y="0"/>
-          <a:chExt cx="0" cy="0"/>
-        </a:xfrm>
-      </p:grpSpPr>
-      <p:sp>
-        <p:nvSpPr>
-          <p:cNvPr id="2" name="Title 1">
-            <a:extLst>
-              <a:ext uri="{FF2B5EF4-FFF2-40B4-BE49-F238E27FC236}">
-                <a16:creationId xmlns:a16="http://schemas.microsoft.com/office/drawing/2014/main" id="{17427281-9830-2FB5-E037-4213FEBE2BEF}"/>
-              </a:ext>
-            </a:extLst>
-          </p:cNvPr>
-          <p:cNvSpPr>
-            <a:spLocks noGrp="1"/>
-          </p:cNvSpPr>
-          <p:nvPr>
-            <p:ph type="title"/>
-          </p:nvPr>
-        </p:nvSpPr>
-        <p:spPr/>
-        <p:txBody>
-          <a:bodyPr/>
-          <a:lstStyle/>
-          <a:p>
-            <a:r>
-              <a:rPr lang="en-US" dirty="0"/>
-              <a:t>SV Code Structure</a:t>
-            </a:r>
-          </a:p>
-        </p:txBody>
-      </p:sp>
-      <p:pic>
-        <p:nvPicPr>
-          <p:cNvPr id="16" name="Picture 15">
-            <a:extLst>
-              <a:ext uri="{FF2B5EF4-FFF2-40B4-BE49-F238E27FC236}">
-                <a16:creationId xmlns:a16="http://schemas.microsoft.com/office/drawing/2014/main" id="{649E42E1-4E47-0356-DE1A-CB3BDC2FE732}"/>
-              </a:ext>
-            </a:extLst>
-          </p:cNvPr>
-          <p:cNvPicPr>
-            <a:picLocks noChangeAspect="1"/>
-          </p:cNvPicPr>
-          <p:nvPr/>
-        </p:nvPicPr>
-        <p:blipFill>
-          <a:blip r:embed="rId3"/>
-          <a:stretch>
-            <a:fillRect/>
-          </a:stretch>
-        </p:blipFill>
-        <p:spPr>
-          <a:xfrm>
-            <a:off x="568678" y="2334260"/>
-            <a:ext cx="3175000" cy="3975100"/>
-          </a:xfrm>
-          <a:prstGeom prst="rect">
-            <a:avLst/>
-          </a:prstGeom>
-        </p:spPr>
-      </p:pic>
-      <p:sp>
-        <p:nvSpPr>
-          <p:cNvPr id="17" name="TextBox 16">
-            <a:extLst>
-              <a:ext uri="{FF2B5EF4-FFF2-40B4-BE49-F238E27FC236}">
-                <a16:creationId xmlns:a16="http://schemas.microsoft.com/office/drawing/2014/main" id="{CEDBFA96-C9A3-7F2D-8B12-E4B78DE26718}"/>
-              </a:ext>
-            </a:extLst>
-          </p:cNvPr>
-          <p:cNvSpPr txBox="1"/>
-          <p:nvPr/>
-        </p:nvSpPr>
-        <p:spPr>
-          <a:xfrm>
-            <a:off x="4289778" y="2415822"/>
-            <a:ext cx="3178691" cy="369332"/>
-          </a:xfrm>
-          <a:prstGeom prst="rect">
-            <a:avLst/>
-          </a:prstGeom>
-          <a:noFill/>
-        </p:spPr>
-        <p:txBody>
-          <a:bodyPr wrap="none" rtlCol="0">
-            <a:spAutoFit/>
-          </a:bodyPr>
-          <a:lstStyle/>
-          <a:p>
-            <a:r>
-              <a:rPr lang="en-US" dirty="0"/>
-              <a:t>Init State: Initializes variables</a:t>
-            </a:r>
-          </a:p>
-        </p:txBody>
-      </p:sp>
-      <p:sp>
-        <p:nvSpPr>
-          <p:cNvPr id="18" name="TextBox 17">
-            <a:extLst>
-              <a:ext uri="{FF2B5EF4-FFF2-40B4-BE49-F238E27FC236}">
-                <a16:creationId xmlns:a16="http://schemas.microsoft.com/office/drawing/2014/main" id="{3A47180E-62BE-178C-E93E-92274446C6D0}"/>
-              </a:ext>
-            </a:extLst>
-          </p:cNvPr>
-          <p:cNvSpPr txBox="1"/>
-          <p:nvPr/>
-        </p:nvSpPr>
-        <p:spPr>
-          <a:xfrm>
-            <a:off x="4289778" y="3059668"/>
-            <a:ext cx="4530727" cy="369332"/>
-          </a:xfrm>
-          <a:prstGeom prst="rect">
-            <a:avLst/>
-          </a:prstGeom>
-          <a:noFill/>
-        </p:spPr>
-        <p:txBody>
-          <a:bodyPr wrap="none" rtlCol="0">
-            <a:spAutoFit/>
-          </a:bodyPr>
-          <a:lstStyle/>
-          <a:p>
-            <a:r>
-              <a:rPr lang="en-US" dirty="0"/>
-              <a:t>Timer Loop State: Runs the outer for-loop</a:t>
-            </a:r>
-          </a:p>
-        </p:txBody>
-      </p:sp>
-      <p:sp>
-        <p:nvSpPr>
-          <p:cNvPr id="19" name="TextBox 18">
-            <a:extLst>
-              <a:ext uri="{FF2B5EF4-FFF2-40B4-BE49-F238E27FC236}">
-                <a16:creationId xmlns:a16="http://schemas.microsoft.com/office/drawing/2014/main" id="{DFDBF40C-32D0-9EA8-398C-8012719FFE84}"/>
-              </a:ext>
-            </a:extLst>
-          </p:cNvPr>
-          <p:cNvSpPr txBox="1"/>
-          <p:nvPr/>
-        </p:nvSpPr>
-        <p:spPr>
-          <a:xfrm>
-            <a:off x="4289777" y="3703514"/>
-            <a:ext cx="4973413" cy="369332"/>
-          </a:xfrm>
-          <a:prstGeom prst="rect">
-            <a:avLst/>
-          </a:prstGeom>
-          <a:noFill/>
-        </p:spPr>
-        <p:txBody>
-          <a:bodyPr wrap="none" rtlCol="0">
-            <a:spAutoFit/>
-          </a:bodyPr>
-          <a:lstStyle/>
-          <a:p>
-            <a:r>
-              <a:rPr lang="en-US" dirty="0"/>
-              <a:t>Load Voltage State: Reads in the C, I, G values</a:t>
-            </a:r>
-          </a:p>
-        </p:txBody>
-      </p:sp>
-      <p:sp>
-        <p:nvSpPr>
-          <p:cNvPr id="20" name="TextBox 19">
-            <a:extLst>
-              <a:ext uri="{FF2B5EF4-FFF2-40B4-BE49-F238E27FC236}">
-                <a16:creationId xmlns:a16="http://schemas.microsoft.com/office/drawing/2014/main" id="{4DF653B1-7B71-158B-39A9-AA728801D632}"/>
-              </a:ext>
-            </a:extLst>
-          </p:cNvPr>
-          <p:cNvSpPr txBox="1"/>
-          <p:nvPr/>
-        </p:nvSpPr>
-        <p:spPr>
-          <a:xfrm>
-            <a:off x="4289777" y="4321810"/>
-            <a:ext cx="5423280" cy="369332"/>
-          </a:xfrm>
-          <a:prstGeom prst="rect">
-            <a:avLst/>
-          </a:prstGeom>
-          <a:noFill/>
-        </p:spPr>
-        <p:txBody>
-          <a:bodyPr wrap="none" rtlCol="0">
-            <a:spAutoFit/>
-          </a:bodyPr>
-          <a:lstStyle/>
-          <a:p>
-            <a:r>
-              <a:rPr lang="en-US" dirty="0"/>
-              <a:t>Voltage State: Performs voltage loop computation</a:t>
-            </a:r>
-          </a:p>
-        </p:txBody>
-      </p:sp>
-      <p:sp>
-        <p:nvSpPr>
-          <p:cNvPr id="21" name="TextBox 20">
-            <a:extLst>
-              <a:ext uri="{FF2B5EF4-FFF2-40B4-BE49-F238E27FC236}">
-                <a16:creationId xmlns:a16="http://schemas.microsoft.com/office/drawing/2014/main" id="{7A696BB2-EC1F-87BC-6C2C-8CCD5EC90678}"/>
-              </a:ext>
-            </a:extLst>
-          </p:cNvPr>
-          <p:cNvSpPr txBox="1"/>
-          <p:nvPr/>
-        </p:nvSpPr>
-        <p:spPr>
-          <a:xfrm>
-            <a:off x="4287389" y="4978775"/>
-            <a:ext cx="4943533" cy="369332"/>
-          </a:xfrm>
-          <a:prstGeom prst="rect">
-            <a:avLst/>
-          </a:prstGeom>
-          <a:noFill/>
-        </p:spPr>
-        <p:txBody>
-          <a:bodyPr wrap="none" rtlCol="0">
-            <a:spAutoFit/>
-          </a:bodyPr>
-          <a:lstStyle/>
-          <a:p>
-            <a:r>
-              <a:rPr lang="en-US" dirty="0"/>
-              <a:t>Load Current State: Reads in the L, V, R values</a:t>
-            </a:r>
-          </a:p>
-        </p:txBody>
-      </p:sp>
-      <p:sp>
-        <p:nvSpPr>
-          <p:cNvPr id="22" name="TextBox 21">
-            <a:extLst>
-              <a:ext uri="{FF2B5EF4-FFF2-40B4-BE49-F238E27FC236}">
-                <a16:creationId xmlns:a16="http://schemas.microsoft.com/office/drawing/2014/main" id="{C398ED57-5F8C-6166-4574-6E1CC4244EF9}"/>
-              </a:ext>
-            </a:extLst>
-          </p:cNvPr>
-          <p:cNvSpPr txBox="1"/>
-          <p:nvPr/>
-        </p:nvSpPr>
-        <p:spPr>
-          <a:xfrm>
-            <a:off x="4287389" y="5597071"/>
-            <a:ext cx="5386154" cy="369332"/>
-          </a:xfrm>
-          <a:prstGeom prst="rect">
-            <a:avLst/>
-          </a:prstGeom>
-          <a:noFill/>
-        </p:spPr>
-        <p:txBody>
-          <a:bodyPr wrap="none" rtlCol="0">
-            <a:spAutoFit/>
-          </a:bodyPr>
-          <a:lstStyle/>
-          <a:p>
-            <a:r>
-              <a:rPr lang="en-US" dirty="0"/>
-              <a:t>Current State: Performs current loop computation</a:t>
-            </a:r>
-          </a:p>
-        </p:txBody>
-      </p:sp>
-    </p:spTree>
-    <p:extLst>
-      <p:ext uri="{BB962C8B-B14F-4D97-AF65-F5344CB8AC3E}">
-        <p14:creationId xmlns:p14="http://schemas.microsoft.com/office/powerpoint/2010/main" val="3512280375"/>
-      </p:ext>
-    </p:extLst>
-  </p:cSld>
-  <p:clrMapOvr>
-    <a:masterClrMapping/>
-  </p:clrMapOvr>
-</p:sld>
-</file>
-
 <file path=ppt/slides/slide6.xml><?xml version="1.0" encoding="utf-8"?>
 <p:sld xmlns:a="http://schemas.openxmlformats.org/drawingml/2006/main" xmlns:r="http://schemas.openxmlformats.org/officeDocument/2006/relationships" xmlns:p="http://schemas.openxmlformats.org/presentationml/2006/main">
   <p:cSld>
@@ -9903,6 +10220,556 @@
           <a:p>
             <a:r>
               <a:rPr lang="en-US" dirty="0"/>
+              <a:t>SV Code Structure</a:t>
+            </a:r>
+          </a:p>
+        </p:txBody>
+      </p:sp>
+      <p:pic>
+        <p:nvPicPr>
+          <p:cNvPr id="16" name="Picture 15">
+            <a:extLst>
+              <a:ext uri="{FF2B5EF4-FFF2-40B4-BE49-F238E27FC236}">
+                <a16:creationId xmlns:a16="http://schemas.microsoft.com/office/drawing/2014/main" id="{649E42E1-4E47-0356-DE1A-CB3BDC2FE732}"/>
+              </a:ext>
+            </a:extLst>
+          </p:cNvPr>
+          <p:cNvPicPr>
+            <a:picLocks noChangeAspect="1"/>
+          </p:cNvPicPr>
+          <p:nvPr/>
+        </p:nvPicPr>
+        <p:blipFill>
+          <a:blip r:embed="rId3"/>
+          <a:stretch>
+            <a:fillRect/>
+          </a:stretch>
+        </p:blipFill>
+        <p:spPr>
+          <a:xfrm>
+            <a:off x="568678" y="2334260"/>
+            <a:ext cx="3175000" cy="3975100"/>
+          </a:xfrm>
+          <a:prstGeom prst="rect">
+            <a:avLst/>
+          </a:prstGeom>
+        </p:spPr>
+      </p:pic>
+      <p:sp>
+        <p:nvSpPr>
+          <p:cNvPr id="17" name="TextBox 16">
+            <a:extLst>
+              <a:ext uri="{FF2B5EF4-FFF2-40B4-BE49-F238E27FC236}">
+                <a16:creationId xmlns:a16="http://schemas.microsoft.com/office/drawing/2014/main" id="{CEDBFA96-C9A3-7F2D-8B12-E4B78DE26718}"/>
+              </a:ext>
+            </a:extLst>
+          </p:cNvPr>
+          <p:cNvSpPr txBox="1"/>
+          <p:nvPr/>
+        </p:nvSpPr>
+        <p:spPr>
+          <a:xfrm>
+            <a:off x="5615940" y="2495832"/>
+            <a:ext cx="3178691" cy="369332"/>
+          </a:xfrm>
+          <a:prstGeom prst="rect">
+            <a:avLst/>
+          </a:prstGeom>
+          <a:noFill/>
+        </p:spPr>
+        <p:txBody>
+          <a:bodyPr wrap="none" rtlCol="0">
+            <a:spAutoFit/>
+          </a:bodyPr>
+          <a:lstStyle/>
+          <a:p>
+            <a:r>
+              <a:rPr lang="en-US" dirty="0"/>
+              <a:t>Init State: Initializes variables</a:t>
+            </a:r>
+          </a:p>
+        </p:txBody>
+      </p:sp>
+      <p:sp>
+        <p:nvSpPr>
+          <p:cNvPr id="18" name="TextBox 17">
+            <a:extLst>
+              <a:ext uri="{FF2B5EF4-FFF2-40B4-BE49-F238E27FC236}">
+                <a16:creationId xmlns:a16="http://schemas.microsoft.com/office/drawing/2014/main" id="{3A47180E-62BE-178C-E93E-92274446C6D0}"/>
+              </a:ext>
+            </a:extLst>
+          </p:cNvPr>
+          <p:cNvSpPr txBox="1"/>
+          <p:nvPr/>
+        </p:nvSpPr>
+        <p:spPr>
+          <a:xfrm>
+            <a:off x="5615940" y="3139678"/>
+            <a:ext cx="4530727" cy="369332"/>
+          </a:xfrm>
+          <a:prstGeom prst="rect">
+            <a:avLst/>
+          </a:prstGeom>
+          <a:noFill/>
+        </p:spPr>
+        <p:txBody>
+          <a:bodyPr wrap="none" rtlCol="0">
+            <a:spAutoFit/>
+          </a:bodyPr>
+          <a:lstStyle/>
+          <a:p>
+            <a:r>
+              <a:rPr lang="en-US" dirty="0"/>
+              <a:t>Timer Loop State: Runs the outer for-loop</a:t>
+            </a:r>
+          </a:p>
+        </p:txBody>
+      </p:sp>
+      <p:sp>
+        <p:nvSpPr>
+          <p:cNvPr id="19" name="TextBox 18">
+            <a:extLst>
+              <a:ext uri="{FF2B5EF4-FFF2-40B4-BE49-F238E27FC236}">
+                <a16:creationId xmlns:a16="http://schemas.microsoft.com/office/drawing/2014/main" id="{DFDBF40C-32D0-9EA8-398C-8012719FFE84}"/>
+              </a:ext>
+            </a:extLst>
+          </p:cNvPr>
+          <p:cNvSpPr txBox="1"/>
+          <p:nvPr/>
+        </p:nvSpPr>
+        <p:spPr>
+          <a:xfrm>
+            <a:off x="5615939" y="3783524"/>
+            <a:ext cx="4973413" cy="369332"/>
+          </a:xfrm>
+          <a:prstGeom prst="rect">
+            <a:avLst/>
+          </a:prstGeom>
+          <a:noFill/>
+        </p:spPr>
+        <p:txBody>
+          <a:bodyPr wrap="none" rtlCol="0">
+            <a:spAutoFit/>
+          </a:bodyPr>
+          <a:lstStyle/>
+          <a:p>
+            <a:r>
+              <a:rPr lang="en-US" dirty="0"/>
+              <a:t>Load Voltage State: Reads in the C, I, G values</a:t>
+            </a:r>
+          </a:p>
+        </p:txBody>
+      </p:sp>
+      <p:sp>
+        <p:nvSpPr>
+          <p:cNvPr id="20" name="TextBox 19">
+            <a:extLst>
+              <a:ext uri="{FF2B5EF4-FFF2-40B4-BE49-F238E27FC236}">
+                <a16:creationId xmlns:a16="http://schemas.microsoft.com/office/drawing/2014/main" id="{4DF653B1-7B71-158B-39A9-AA728801D632}"/>
+              </a:ext>
+            </a:extLst>
+          </p:cNvPr>
+          <p:cNvSpPr txBox="1"/>
+          <p:nvPr/>
+        </p:nvSpPr>
+        <p:spPr>
+          <a:xfrm>
+            <a:off x="5615939" y="4401820"/>
+            <a:ext cx="5423280" cy="369332"/>
+          </a:xfrm>
+          <a:prstGeom prst="rect">
+            <a:avLst/>
+          </a:prstGeom>
+          <a:noFill/>
+        </p:spPr>
+        <p:txBody>
+          <a:bodyPr wrap="none" rtlCol="0">
+            <a:spAutoFit/>
+          </a:bodyPr>
+          <a:lstStyle/>
+          <a:p>
+            <a:r>
+              <a:rPr lang="en-US" dirty="0"/>
+              <a:t>Voltage State: Performs voltage loop computation</a:t>
+            </a:r>
+          </a:p>
+        </p:txBody>
+      </p:sp>
+      <p:sp>
+        <p:nvSpPr>
+          <p:cNvPr id="21" name="TextBox 20">
+            <a:extLst>
+              <a:ext uri="{FF2B5EF4-FFF2-40B4-BE49-F238E27FC236}">
+                <a16:creationId xmlns:a16="http://schemas.microsoft.com/office/drawing/2014/main" id="{7A696BB2-EC1F-87BC-6C2C-8CCD5EC90678}"/>
+              </a:ext>
+            </a:extLst>
+          </p:cNvPr>
+          <p:cNvSpPr txBox="1"/>
+          <p:nvPr/>
+        </p:nvSpPr>
+        <p:spPr>
+          <a:xfrm>
+            <a:off x="5613551" y="5058785"/>
+            <a:ext cx="4943533" cy="369332"/>
+          </a:xfrm>
+          <a:prstGeom prst="rect">
+            <a:avLst/>
+          </a:prstGeom>
+          <a:noFill/>
+        </p:spPr>
+        <p:txBody>
+          <a:bodyPr wrap="none" rtlCol="0">
+            <a:spAutoFit/>
+          </a:bodyPr>
+          <a:lstStyle/>
+          <a:p>
+            <a:r>
+              <a:rPr lang="en-US" dirty="0"/>
+              <a:t>Load Current State: Reads in the L, V, R values</a:t>
+            </a:r>
+          </a:p>
+        </p:txBody>
+      </p:sp>
+      <p:sp>
+        <p:nvSpPr>
+          <p:cNvPr id="22" name="TextBox 21">
+            <a:extLst>
+              <a:ext uri="{FF2B5EF4-FFF2-40B4-BE49-F238E27FC236}">
+                <a16:creationId xmlns:a16="http://schemas.microsoft.com/office/drawing/2014/main" id="{C398ED57-5F8C-6166-4574-6E1CC4244EF9}"/>
+              </a:ext>
+            </a:extLst>
+          </p:cNvPr>
+          <p:cNvSpPr txBox="1"/>
+          <p:nvPr/>
+        </p:nvSpPr>
+        <p:spPr>
+          <a:xfrm>
+            <a:off x="5613551" y="5677081"/>
+            <a:ext cx="5386154" cy="369332"/>
+          </a:xfrm>
+          <a:prstGeom prst="rect">
+            <a:avLst/>
+          </a:prstGeom>
+          <a:noFill/>
+        </p:spPr>
+        <p:txBody>
+          <a:bodyPr wrap="none" rtlCol="0">
+            <a:spAutoFit/>
+          </a:bodyPr>
+          <a:lstStyle/>
+          <a:p>
+            <a:r>
+              <a:rPr lang="en-US" dirty="0"/>
+              <a:t>Current State: Performs current loop computation</a:t>
+            </a:r>
+          </a:p>
+        </p:txBody>
+      </p:sp>
+      <p:sp>
+        <p:nvSpPr>
+          <p:cNvPr id="7" name="Right Bracket 6">
+            <a:extLst>
+              <a:ext uri="{FF2B5EF4-FFF2-40B4-BE49-F238E27FC236}">
+                <a16:creationId xmlns:a16="http://schemas.microsoft.com/office/drawing/2014/main" id="{11B29A61-178B-B05B-ADEB-9263D4AA4085}"/>
+              </a:ext>
+            </a:extLst>
+          </p:cNvPr>
+          <p:cNvSpPr/>
+          <p:nvPr/>
+        </p:nvSpPr>
+        <p:spPr>
+          <a:xfrm>
+            <a:off x="2537460" y="3772094"/>
+            <a:ext cx="205740" cy="802962"/>
+          </a:xfrm>
+          <a:prstGeom prst="rightBracket">
+            <a:avLst/>
+          </a:prstGeom>
+          <a:ln w="38100">
+            <a:solidFill>
+              <a:srgbClr val="00B050"/>
+            </a:solidFill>
+          </a:ln>
+        </p:spPr>
+        <p:style>
+          <a:lnRef idx="1">
+            <a:schemeClr val="accent1"/>
+          </a:lnRef>
+          <a:fillRef idx="0">
+            <a:schemeClr val="accent1"/>
+          </a:fillRef>
+          <a:effectRef idx="0">
+            <a:schemeClr val="accent1"/>
+          </a:effectRef>
+          <a:fontRef idx="minor">
+            <a:schemeClr val="tx1"/>
+          </a:fontRef>
+        </p:style>
+        <p:txBody>
+          <a:bodyPr rtlCol="0" anchor="ctr"/>
+          <a:lstStyle/>
+          <a:p>
+            <a:pPr algn="ctr"/>
+            <a:endParaRPr lang="en-US"/>
+          </a:p>
+        </p:txBody>
+      </p:sp>
+      <p:sp>
+        <p:nvSpPr>
+          <p:cNvPr id="8" name="Right Bracket 7">
+            <a:extLst>
+              <a:ext uri="{FF2B5EF4-FFF2-40B4-BE49-F238E27FC236}">
+                <a16:creationId xmlns:a16="http://schemas.microsoft.com/office/drawing/2014/main" id="{B087D7B5-90ED-F867-5D06-8F9E30AAC090}"/>
+              </a:ext>
+            </a:extLst>
+          </p:cNvPr>
+          <p:cNvSpPr/>
+          <p:nvPr/>
+        </p:nvSpPr>
+        <p:spPr>
+          <a:xfrm>
+            <a:off x="2537460" y="5112363"/>
+            <a:ext cx="205740" cy="802962"/>
+          </a:xfrm>
+          <a:prstGeom prst="rightBracket">
+            <a:avLst/>
+          </a:prstGeom>
+          <a:ln w="38100">
+            <a:solidFill>
+              <a:srgbClr val="00B050"/>
+            </a:solidFill>
+          </a:ln>
+        </p:spPr>
+        <p:style>
+          <a:lnRef idx="1">
+            <a:schemeClr val="accent1"/>
+          </a:lnRef>
+          <a:fillRef idx="0">
+            <a:schemeClr val="accent1"/>
+          </a:fillRef>
+          <a:effectRef idx="0">
+            <a:schemeClr val="accent1"/>
+          </a:effectRef>
+          <a:fontRef idx="minor">
+            <a:schemeClr val="tx1"/>
+          </a:fontRef>
+        </p:style>
+        <p:txBody>
+          <a:bodyPr rtlCol="0" anchor="ctr"/>
+          <a:lstStyle/>
+          <a:p>
+            <a:pPr algn="ctr"/>
+            <a:endParaRPr lang="en-US"/>
+          </a:p>
+        </p:txBody>
+      </p:sp>
+      <p:sp>
+        <p:nvSpPr>
+          <p:cNvPr id="9" name="Right Bracket 8">
+            <a:extLst>
+              <a:ext uri="{FF2B5EF4-FFF2-40B4-BE49-F238E27FC236}">
+                <a16:creationId xmlns:a16="http://schemas.microsoft.com/office/drawing/2014/main" id="{A9B7525E-415F-F772-8955-F8052F1D2943}"/>
+              </a:ext>
+            </a:extLst>
+          </p:cNvPr>
+          <p:cNvSpPr/>
+          <p:nvPr/>
+        </p:nvSpPr>
+        <p:spPr>
+          <a:xfrm>
+            <a:off x="3640808" y="3555279"/>
+            <a:ext cx="205740" cy="2360046"/>
+          </a:xfrm>
+          <a:prstGeom prst="rightBracket">
+            <a:avLst/>
+          </a:prstGeom>
+          <a:ln w="38100">
+            <a:solidFill>
+              <a:srgbClr val="00B050"/>
+            </a:solidFill>
+          </a:ln>
+        </p:spPr>
+        <p:style>
+          <a:lnRef idx="1">
+            <a:schemeClr val="accent1"/>
+          </a:lnRef>
+          <a:fillRef idx="0">
+            <a:schemeClr val="accent1"/>
+          </a:fillRef>
+          <a:effectRef idx="0">
+            <a:schemeClr val="accent1"/>
+          </a:effectRef>
+          <a:fontRef idx="minor">
+            <a:schemeClr val="tx1"/>
+          </a:fontRef>
+        </p:style>
+        <p:txBody>
+          <a:bodyPr rtlCol="0" anchor="ctr"/>
+          <a:lstStyle/>
+          <a:p>
+            <a:pPr algn="ctr"/>
+            <a:endParaRPr lang="en-US"/>
+          </a:p>
+        </p:txBody>
+      </p:sp>
+      <p:sp>
+        <p:nvSpPr>
+          <p:cNvPr id="10" name="TextBox 9">
+            <a:extLst>
+              <a:ext uri="{FF2B5EF4-FFF2-40B4-BE49-F238E27FC236}">
+                <a16:creationId xmlns:a16="http://schemas.microsoft.com/office/drawing/2014/main" id="{7622C2AE-4B6B-D4AD-6CB3-98BAC96E7307}"/>
+              </a:ext>
+            </a:extLst>
+          </p:cNvPr>
+          <p:cNvSpPr txBox="1"/>
+          <p:nvPr/>
+        </p:nvSpPr>
+        <p:spPr>
+          <a:xfrm>
+            <a:off x="2788073" y="3894629"/>
+            <a:ext cx="852735" cy="646331"/>
+          </a:xfrm>
+          <a:prstGeom prst="rect">
+            <a:avLst/>
+          </a:prstGeom>
+          <a:noFill/>
+        </p:spPr>
+        <p:txBody>
+          <a:bodyPr wrap="square" rtlCol="0">
+            <a:spAutoFit/>
+          </a:bodyPr>
+          <a:lstStyle/>
+          <a:p>
+            <a:r>
+              <a:rPr lang="en-US" dirty="0"/>
+              <a:t>Node loop</a:t>
+            </a:r>
+          </a:p>
+        </p:txBody>
+      </p:sp>
+      <p:sp>
+        <p:nvSpPr>
+          <p:cNvPr id="11" name="TextBox 10">
+            <a:extLst>
+              <a:ext uri="{FF2B5EF4-FFF2-40B4-BE49-F238E27FC236}">
+                <a16:creationId xmlns:a16="http://schemas.microsoft.com/office/drawing/2014/main" id="{88B59BDF-1675-77AD-A423-2A25FCD52B51}"/>
+              </a:ext>
+            </a:extLst>
+          </p:cNvPr>
+          <p:cNvSpPr txBox="1"/>
+          <p:nvPr/>
+        </p:nvSpPr>
+        <p:spPr>
+          <a:xfrm>
+            <a:off x="2788073" y="5190678"/>
+            <a:ext cx="964348" cy="646331"/>
+          </a:xfrm>
+          <a:prstGeom prst="rect">
+            <a:avLst/>
+          </a:prstGeom>
+          <a:noFill/>
+        </p:spPr>
+        <p:txBody>
+          <a:bodyPr wrap="square" rtlCol="0">
+            <a:spAutoFit/>
+          </a:bodyPr>
+          <a:lstStyle/>
+          <a:p>
+            <a:r>
+              <a:rPr lang="en-US" dirty="0"/>
+              <a:t>Branch loop</a:t>
+            </a:r>
+          </a:p>
+        </p:txBody>
+      </p:sp>
+      <p:sp>
+        <p:nvSpPr>
+          <p:cNvPr id="12" name="TextBox 11">
+            <a:extLst>
+              <a:ext uri="{FF2B5EF4-FFF2-40B4-BE49-F238E27FC236}">
+                <a16:creationId xmlns:a16="http://schemas.microsoft.com/office/drawing/2014/main" id="{39FB56A7-4AAA-0E64-383D-1202BB581847}"/>
+              </a:ext>
+            </a:extLst>
+          </p:cNvPr>
+          <p:cNvSpPr txBox="1"/>
+          <p:nvPr/>
+        </p:nvSpPr>
+        <p:spPr>
+          <a:xfrm>
+            <a:off x="3900994" y="4436556"/>
+            <a:ext cx="798289" cy="646331"/>
+          </a:xfrm>
+          <a:prstGeom prst="rect">
+            <a:avLst/>
+          </a:prstGeom>
+          <a:noFill/>
+        </p:spPr>
+        <p:txBody>
+          <a:bodyPr wrap="square" rtlCol="0">
+            <a:spAutoFit/>
+          </a:bodyPr>
+          <a:lstStyle/>
+          <a:p>
+            <a:r>
+              <a:rPr lang="en-US" dirty="0"/>
+              <a:t>Time loop</a:t>
+            </a:r>
+          </a:p>
+        </p:txBody>
+      </p:sp>
+    </p:spTree>
+    <p:extLst>
+      <p:ext uri="{BB962C8B-B14F-4D97-AF65-F5344CB8AC3E}">
+        <p14:creationId xmlns:p14="http://schemas.microsoft.com/office/powerpoint/2010/main" val="3512280375"/>
+      </p:ext>
+    </p:extLst>
+  </p:cSld>
+  <p:clrMapOvr>
+    <a:masterClrMapping/>
+  </p:clrMapOvr>
+</p:sld>
+</file>
+
+<file path=ppt/slides/slide7.xml><?xml version="1.0" encoding="utf-8"?>
+<p:sld xmlns:a="http://schemas.openxmlformats.org/drawingml/2006/main" xmlns:r="http://schemas.openxmlformats.org/officeDocument/2006/relationships" xmlns:p="http://schemas.openxmlformats.org/presentationml/2006/main">
+  <p:cSld>
+    <p:spTree>
+      <p:nvGrpSpPr>
+        <p:cNvPr id="1" name=""/>
+        <p:cNvGrpSpPr/>
+        <p:nvPr/>
+      </p:nvGrpSpPr>
+      <p:grpSpPr>
+        <a:xfrm>
+          <a:off x="0" y="0"/>
+          <a:ext cx="0" cy="0"/>
+          <a:chOff x="0" y="0"/>
+          <a:chExt cx="0" cy="0"/>
+        </a:xfrm>
+      </p:grpSpPr>
+      <p:sp>
+        <p:nvSpPr>
+          <p:cNvPr id="2" name="Title 1">
+            <a:extLst>
+              <a:ext uri="{FF2B5EF4-FFF2-40B4-BE49-F238E27FC236}">
+                <a16:creationId xmlns:a16="http://schemas.microsoft.com/office/drawing/2014/main" id="{17427281-9830-2FB5-E037-4213FEBE2BEF}"/>
+              </a:ext>
+            </a:extLst>
+          </p:cNvPr>
+          <p:cNvSpPr>
+            <a:spLocks noGrp="1"/>
+          </p:cNvSpPr>
+          <p:nvPr>
+            <p:ph type="title"/>
+          </p:nvPr>
+        </p:nvSpPr>
+        <p:spPr/>
+        <p:txBody>
+          <a:bodyPr/>
+          <a:lstStyle/>
+          <a:p>
+            <a:r>
+              <a:rPr lang="en-US" dirty="0"/>
               <a:t>Running Simulation</a:t>
             </a:r>
           </a:p>
@@ -10087,7 +10954,7 @@
 </p:sld>
 </file>
 
-<file path=ppt/slides/slide7.xml><?xml version="1.0" encoding="utf-8"?>
+<file path=ppt/slides/slide8.xml><?xml version="1.0" encoding="utf-8"?>
 <p:sld xmlns:a="http://schemas.openxmlformats.org/drawingml/2006/main" xmlns:r="http://schemas.openxmlformats.org/officeDocument/2006/relationships" xmlns:p="http://schemas.openxmlformats.org/presentationml/2006/main">
   <p:cSld>
     <p:spTree>

</xml_diff>